<commit_message>
add header, updated my code | Yan
</commit_message>
<xml_diff>
--- a/Illustration/diagram.pptx
+++ b/Illustration/diagram.pptx
@@ -3359,7 +3359,7 @@
         </p:nvCxnSpPr>
         <p:spPr>
           <a:xfrm>
-            <a:off x="3655089" y="513236"/>
+            <a:off x="4084360" y="1911639"/>
             <a:ext cx="7225" cy="382751"/>
           </a:xfrm>
           <a:prstGeom prst="line">
@@ -3396,7 +3396,7 @@
         </p:nvCxnSpPr>
         <p:spPr>
           <a:xfrm>
-            <a:off x="5155347" y="513236"/>
+            <a:off x="5584618" y="1911639"/>
             <a:ext cx="7225" cy="382751"/>
           </a:xfrm>
           <a:prstGeom prst="line">
@@ -3433,7 +3433,7 @@
         </p:nvCxnSpPr>
         <p:spPr>
           <a:xfrm flipV="1">
-            <a:off x="3662314" y="678515"/>
+            <a:off x="4091585" y="2076918"/>
             <a:ext cx="1500258" cy="8699"/>
           </a:xfrm>
           <a:prstGeom prst="line">
@@ -3472,7 +3472,7 @@
         </p:nvSpPr>
         <p:spPr>
           <a:xfrm>
-            <a:off x="3927426" y="489831"/>
+            <a:off x="4356697" y="1888234"/>
             <a:ext cx="948105" cy="307777"/>
           </a:xfrm>
           <a:prstGeom prst="rect">
@@ -3661,6 +3661,13 @@
   <p:clrMapOvr>
     <a:masterClrMapping/>
   </p:clrMapOvr>
+  <p:timing>
+    <p:tnLst>
+      <p:par>
+        <p:cTn xmlns:p14="http://schemas.microsoft.com/office/powerpoint/2010/main" id="1" dur="indefinite" restart="never" nodeType="tmRoot"/>
+      </p:par>
+    </p:tnLst>
+  </p:timing>
 </p:sld>
 </file>
 

</xml_diff>